<commit_message>
se versiona la agregación de un inciso en el
</commit_message>
<xml_diff>
--- a/SSAP (Sistema Super Administrador de Proyectos).pptx
+++ b/SSAP (Sistema Super Administrador de Proyectos).pptx
@@ -14,25 +14,26 @@
     <p:sldId id="287" r:id="rId8"/>
     <p:sldId id="264" r:id="rId9"/>
     <p:sldId id="259" r:id="rId10"/>
-    <p:sldId id="267" r:id="rId11"/>
-    <p:sldId id="284" r:id="rId12"/>
-    <p:sldId id="268" r:id="rId13"/>
-    <p:sldId id="285" r:id="rId14"/>
-    <p:sldId id="269" r:id="rId15"/>
-    <p:sldId id="276" r:id="rId16"/>
-    <p:sldId id="270" r:id="rId17"/>
-    <p:sldId id="277" r:id="rId18"/>
-    <p:sldId id="271" r:id="rId19"/>
-    <p:sldId id="279" r:id="rId20"/>
-    <p:sldId id="272" r:id="rId21"/>
-    <p:sldId id="278" r:id="rId22"/>
-    <p:sldId id="273" r:id="rId23"/>
-    <p:sldId id="280" r:id="rId24"/>
-    <p:sldId id="274" r:id="rId25"/>
-    <p:sldId id="281" r:id="rId26"/>
-    <p:sldId id="275" r:id="rId27"/>
-    <p:sldId id="282" r:id="rId28"/>
-    <p:sldId id="261" r:id="rId29"/>
+    <p:sldId id="288" r:id="rId11"/>
+    <p:sldId id="267" r:id="rId12"/>
+    <p:sldId id="284" r:id="rId13"/>
+    <p:sldId id="268" r:id="rId14"/>
+    <p:sldId id="285" r:id="rId15"/>
+    <p:sldId id="269" r:id="rId16"/>
+    <p:sldId id="276" r:id="rId17"/>
+    <p:sldId id="270" r:id="rId18"/>
+    <p:sldId id="277" r:id="rId19"/>
+    <p:sldId id="271" r:id="rId20"/>
+    <p:sldId id="279" r:id="rId21"/>
+    <p:sldId id="272" r:id="rId22"/>
+    <p:sldId id="278" r:id="rId23"/>
+    <p:sldId id="273" r:id="rId24"/>
+    <p:sldId id="280" r:id="rId25"/>
+    <p:sldId id="274" r:id="rId26"/>
+    <p:sldId id="281" r:id="rId27"/>
+    <p:sldId id="275" r:id="rId28"/>
+    <p:sldId id="282" r:id="rId29"/>
+    <p:sldId id="261" r:id="rId30"/>
   </p:sldIdLst>
   <p:sldSz cx="12192000" cy="6858000"/>
   <p:notesSz cx="6858000" cy="9144000"/>
@@ -4882,14 +4883,6 @@
 <file path=ppt/slides/slide10.xml><?xml version="1.0" encoding="utf-8"?>
 <p:sld xmlns:a="http://schemas.openxmlformats.org/drawingml/2006/main" xmlns:r="http://schemas.openxmlformats.org/officeDocument/2006/relationships" xmlns:p="http://schemas.openxmlformats.org/presentationml/2006/main">
   <p:cSld>
-    <p:bg>
-      <p:bgPr>
-        <a:solidFill>
-          <a:schemeClr val="bg2"/>
-        </a:solidFill>
-        <a:effectLst/>
-      </p:bgPr>
-    </p:bg>
     <p:spTree>
       <p:nvGrpSpPr>
         <p:cNvPr id="1" name=""/>
@@ -4906,123 +4899,6 @@
       </p:grpSpPr>
       <p:sp>
         <p:nvSpPr>
-          <p:cNvPr id="9" name="Rectangle 8">
-            <a:extLst>
-              <a:ext uri="{FF2B5EF4-FFF2-40B4-BE49-F238E27FC236}">
-                <a16:creationId xmlns:a16="http://schemas.microsoft.com/office/drawing/2014/main" id="{10F24D38-B79E-44B4-830E-043F45D96DC2}"/>
-              </a:ext>
-              <a:ext uri="{C183D7F6-B498-43B3-948B-1728B52AA6E4}">
-                <adec:decorative xmlns:adec="http://schemas.microsoft.com/office/drawing/2017/decorative" val="1"/>
-              </a:ext>
-            </a:extLst>
-          </p:cNvPr>
-          <p:cNvSpPr>
-            <a:spLocks noGrp="1" noRot="1" noChangeAspect="1" noMove="1" noResize="1" noEditPoints="1" noAdjustHandles="1" noChangeArrowheads="1" noChangeShapeType="1" noTextEdit="1"/>
-          </p:cNvSpPr>
-          <p:nvPr>
-            <p:extLst>
-              <p:ext uri="{386F3935-93C4-4BCD-93E2-E3B085C9AB24}">
-                <p16:designElem xmlns:p16="http://schemas.microsoft.com/office/powerpoint/2015/main" val="1"/>
-              </p:ext>
-            </p:extLst>
-          </p:nvPr>
-        </p:nvSpPr>
-        <p:spPr>
-          <a:xfrm>
-            <a:off x="0" y="0"/>
-            <a:ext cx="12192000" cy="6858000"/>
-          </a:xfrm>
-          <a:prstGeom prst="rect">
-            <a:avLst/>
-          </a:prstGeom>
-          <a:solidFill>
-            <a:schemeClr val="accent1"/>
-          </a:solidFill>
-          <a:ln>
-            <a:noFill/>
-          </a:ln>
-        </p:spPr>
-        <p:style>
-          <a:lnRef idx="2">
-            <a:schemeClr val="accent1">
-              <a:shade val="50000"/>
-            </a:schemeClr>
-          </a:lnRef>
-          <a:fillRef idx="1">
-            <a:schemeClr val="accent1"/>
-          </a:fillRef>
-          <a:effectRef idx="0">
-            <a:schemeClr val="accent1"/>
-          </a:effectRef>
-          <a:fontRef idx="minor">
-            <a:schemeClr val="lt1"/>
-          </a:fontRef>
-        </p:style>
-        <p:txBody>
-          <a:bodyPr rtlCol="0" anchor="ctr"/>
-          <a:lstStyle/>
-          <a:p>
-            <a:pPr algn="ctr"/>
-            <a:endParaRPr lang="en-US"/>
-          </a:p>
-        </p:txBody>
-      </p:sp>
-      <p:cxnSp>
-        <p:nvCxnSpPr>
-          <p:cNvPr id="11" name="Straight Connector 10">
-            <a:extLst>
-              <a:ext uri="{FF2B5EF4-FFF2-40B4-BE49-F238E27FC236}">
-                <a16:creationId xmlns:a16="http://schemas.microsoft.com/office/drawing/2014/main" id="{FC469874-256B-45B3-A79C-7591B4BA1ECC}"/>
-              </a:ext>
-              <a:ext uri="{C183D7F6-B498-43B3-948B-1728B52AA6E4}">
-                <adec:decorative xmlns:adec="http://schemas.microsoft.com/office/drawing/2017/decorative" val="1"/>
-              </a:ext>
-            </a:extLst>
-          </p:cNvPr>
-          <p:cNvCxnSpPr>
-            <a:cxnSpLocks noGrp="1" noRot="1" noChangeAspect="1" noMove="1" noResize="1" noEditPoints="1" noAdjustHandles="1" noChangeArrowheads="1" noChangeShapeType="1"/>
-          </p:cNvCxnSpPr>
-          <p:nvPr>
-            <p:extLst>
-              <p:ext uri="{386F3935-93C4-4BCD-93E2-E3B085C9AB24}">
-                <p16:designElem xmlns:p16="http://schemas.microsoft.com/office/powerpoint/2015/main" val="1"/>
-              </p:ext>
-            </p:extLst>
-          </p:nvPr>
-        </p:nvCxnSpPr>
-        <p:spPr>
-          <a:xfrm flipV="1">
-            <a:off x="762000" y="826324"/>
-            <a:ext cx="0" cy="914400"/>
-          </a:xfrm>
-          <a:prstGeom prst="line">
-            <a:avLst/>
-          </a:prstGeom>
-          <a:ln w="19050">
-            <a:solidFill>
-              <a:srgbClr val="FFFFFF">
-                <a:alpha val="80000"/>
-              </a:srgbClr>
-            </a:solidFill>
-          </a:ln>
-        </p:spPr>
-        <p:style>
-          <a:lnRef idx="1">
-            <a:schemeClr val="accent1"/>
-          </a:lnRef>
-          <a:fillRef idx="0">
-            <a:schemeClr val="accent1"/>
-          </a:fillRef>
-          <a:effectRef idx="0">
-            <a:schemeClr val="accent1"/>
-          </a:effectRef>
-          <a:fontRef idx="minor">
-            <a:schemeClr val="tx1"/>
-          </a:fontRef>
-        </p:style>
-      </p:cxnSp>
-      <p:sp>
-        <p:nvSpPr>
           <p:cNvPr id="10" name="Título 1">
             <a:extLst>
               <a:ext uri="{FF2B5EF4-FFF2-40B4-BE49-F238E27FC236}">
@@ -5058,17 +4934,17 @@
                 <a:ea typeface="+mj-ea"/>
                 <a:cs typeface="+mj-cs"/>
               </a:rPr>
-              <a:t>CU-DEFINIR TAREAS</a:t>
+              <a:t>CU-CREAR NUEVOS PROYECTOS</a:t>
             </a:r>
           </a:p>
         </p:txBody>
       </p:sp>
       <p:pic>
         <p:nvPicPr>
-          <p:cNvPr id="3" name="Imagen 2" descr="Diagrama&#10;&#10;Descripción generada automáticamente">
-            <a:extLst>
-              <a:ext uri="{FF2B5EF4-FFF2-40B4-BE49-F238E27FC236}">
-                <a16:creationId xmlns:a16="http://schemas.microsoft.com/office/drawing/2014/main" id="{DD02D200-B96B-3D40-2B92-81129E2AE105}"/>
+          <p:cNvPr id="4" name="Imagen 3" descr="Diagrama&#10;&#10;Descripción generada automáticamente">
+            <a:extLst>
+              <a:ext uri="{FF2B5EF4-FFF2-40B4-BE49-F238E27FC236}">
+                <a16:creationId xmlns:a16="http://schemas.microsoft.com/office/drawing/2014/main" id="{89BC3BA9-424A-E8FB-61B2-21D90F8E378E}"/>
               </a:ext>
             </a:extLst>
           </p:cNvPr>
@@ -5091,8 +4967,8 @@
         </p:blipFill>
         <p:spPr>
           <a:xfrm>
-            <a:off x="762000" y="2290127"/>
-            <a:ext cx="10200398" cy="3297873"/>
+            <a:off x="0" y="1986179"/>
+            <a:ext cx="12192000" cy="2885641"/>
           </a:xfrm>
           <a:prstGeom prst="rect">
             <a:avLst/>
@@ -5102,73 +4978,7 @@
     </p:spTree>
     <p:extLst>
       <p:ext uri="{BB962C8B-B14F-4D97-AF65-F5344CB8AC3E}">
-        <p14:creationId xmlns:p14="http://schemas.microsoft.com/office/powerpoint/2010/main" val="2029901963"/>
-      </p:ext>
-    </p:extLst>
-  </p:cSld>
-  <p:clrMapOvr>
-    <a:overrideClrMapping bg1="dk1" tx1="lt1" bg2="dk2" tx2="lt2" accent1="accent1" accent2="accent2" accent3="accent3" accent4="accent4" accent5="accent5" accent6="accent6" hlink="hlink" folHlink="folHlink"/>
-  </p:clrMapOvr>
-</p:sld>
-</file>
-
-<file path=ppt/slides/slide11.xml><?xml version="1.0" encoding="utf-8"?>
-<p:sld xmlns:a="http://schemas.openxmlformats.org/drawingml/2006/main" xmlns:r="http://schemas.openxmlformats.org/officeDocument/2006/relationships" xmlns:p="http://schemas.openxmlformats.org/presentationml/2006/main">
-  <p:cSld>
-    <p:spTree>
-      <p:nvGrpSpPr>
-        <p:cNvPr id="1" name=""/>
-        <p:cNvGrpSpPr/>
-        <p:nvPr/>
-      </p:nvGrpSpPr>
-      <p:grpSpPr>
-        <a:xfrm>
-          <a:off x="0" y="0"/>
-          <a:ext cx="0" cy="0"/>
-          <a:chOff x="0" y="0"/>
-          <a:chExt cx="0" cy="0"/>
-        </a:xfrm>
-      </p:grpSpPr>
-      <p:pic>
-        <p:nvPicPr>
-          <p:cNvPr id="3" name="Imagen 2" descr="Diagrama&#10;&#10;Descripción generada automáticamente">
-            <a:extLst>
-              <a:ext uri="{FF2B5EF4-FFF2-40B4-BE49-F238E27FC236}">
-                <a16:creationId xmlns:a16="http://schemas.microsoft.com/office/drawing/2014/main" id="{AF49E44A-D8BF-6B0E-EF18-4325EC5414D3}"/>
-              </a:ext>
-            </a:extLst>
-          </p:cNvPr>
-          <p:cNvPicPr>
-            <a:picLocks noChangeAspect="1"/>
-          </p:cNvPicPr>
-          <p:nvPr/>
-        </p:nvPicPr>
-        <p:blipFill>
-          <a:blip r:embed="rId2">
-            <a:extLst>
-              <a:ext uri="{28A0092B-C50C-407E-A947-70E740481C1C}">
-                <a14:useLocalDpi xmlns:a14="http://schemas.microsoft.com/office/drawing/2010/main" val="0"/>
-              </a:ext>
-            </a:extLst>
-          </a:blip>
-          <a:stretch>
-            <a:fillRect/>
-          </a:stretch>
-        </p:blipFill>
-        <p:spPr>
-          <a:xfrm>
-            <a:off x="0" y="1866016"/>
-            <a:ext cx="12192000" cy="3125968"/>
-          </a:xfrm>
-          <a:prstGeom prst="rect">
-            <a:avLst/>
-          </a:prstGeom>
-        </p:spPr>
-      </p:pic>
-    </p:spTree>
-    <p:extLst>
-      <p:ext uri="{BB962C8B-B14F-4D97-AF65-F5344CB8AC3E}">
-        <p14:creationId xmlns:p14="http://schemas.microsoft.com/office/powerpoint/2010/main" val="3929183676"/>
+        <p14:creationId xmlns:p14="http://schemas.microsoft.com/office/powerpoint/2010/main" val="2760162849"/>
       </p:ext>
     </p:extLst>
   </p:cSld>
@@ -5178,7 +4988,7 @@
 </p:sld>
 </file>
 
-<file path=ppt/slides/slide12.xml><?xml version="1.0" encoding="utf-8"?>
+<file path=ppt/slides/slide11.xml><?xml version="1.0" encoding="utf-8"?>
 <p:sld xmlns:a="http://schemas.openxmlformats.org/drawingml/2006/main" xmlns:r="http://schemas.openxmlformats.org/officeDocument/2006/relationships" xmlns:p="http://schemas.openxmlformats.org/presentationml/2006/main">
   <p:cSld>
     <p:bg>
@@ -5357,7 +5167,7 @@
                 <a:ea typeface="+mj-ea"/>
                 <a:cs typeface="+mj-cs"/>
               </a:rPr>
-              <a:t>CU-DEFINIR SUBTAREAS</a:t>
+              <a:t>CU-DEFINIR TAREAS</a:t>
             </a:r>
           </a:p>
         </p:txBody>
@@ -5367,7 +5177,7 @@
           <p:cNvPr id="3" name="Imagen 2" descr="Diagrama&#10;&#10;Descripción generada automáticamente">
             <a:extLst>
               <a:ext uri="{FF2B5EF4-FFF2-40B4-BE49-F238E27FC236}">
-                <a16:creationId xmlns:a16="http://schemas.microsoft.com/office/drawing/2014/main" id="{E5552AC8-290F-805F-DED2-796AB4F78878}"/>
+                <a16:creationId xmlns:a16="http://schemas.microsoft.com/office/drawing/2014/main" id="{DD02D200-B96B-3D40-2B92-81129E2AE105}"/>
               </a:ext>
             </a:extLst>
           </p:cNvPr>
@@ -5390,8 +5200,8 @@
         </p:blipFill>
         <p:spPr>
           <a:xfrm>
-            <a:off x="569937" y="2351087"/>
-            <a:ext cx="10878478" cy="2993073"/>
+            <a:off x="762000" y="2290127"/>
+            <a:ext cx="10200398" cy="3297873"/>
           </a:xfrm>
           <a:prstGeom prst="rect">
             <a:avLst/>
@@ -5401,7 +5211,7 @@
     </p:spTree>
     <p:extLst>
       <p:ext uri="{BB962C8B-B14F-4D97-AF65-F5344CB8AC3E}">
-        <p14:creationId xmlns:p14="http://schemas.microsoft.com/office/powerpoint/2010/main" val="624219451"/>
+        <p14:creationId xmlns:p14="http://schemas.microsoft.com/office/powerpoint/2010/main" val="2029901963"/>
       </p:ext>
     </p:extLst>
   </p:cSld>
@@ -5411,7 +5221,7 @@
 </p:sld>
 </file>
 
-<file path=ppt/slides/slide13.xml><?xml version="1.0" encoding="utf-8"?>
+<file path=ppt/slides/slide12.xml><?xml version="1.0" encoding="utf-8"?>
 <p:sld xmlns:a="http://schemas.openxmlformats.org/drawingml/2006/main" xmlns:r="http://schemas.openxmlformats.org/officeDocument/2006/relationships" xmlns:p="http://schemas.openxmlformats.org/presentationml/2006/main">
   <p:cSld>
     <p:spTree>
@@ -5433,7 +5243,7 @@
           <p:cNvPr id="3" name="Imagen 2" descr="Diagrama&#10;&#10;Descripción generada automáticamente">
             <a:extLst>
               <a:ext uri="{FF2B5EF4-FFF2-40B4-BE49-F238E27FC236}">
-                <a16:creationId xmlns:a16="http://schemas.microsoft.com/office/drawing/2014/main" id="{4373A81C-5B4A-D367-C096-447BDABB0297}"/>
+                <a16:creationId xmlns:a16="http://schemas.microsoft.com/office/drawing/2014/main" id="{AF49E44A-D8BF-6B0E-EF18-4325EC5414D3}"/>
               </a:ext>
             </a:extLst>
           </p:cNvPr>
@@ -5456,8 +5266,8 @@
         </p:blipFill>
         <p:spPr>
           <a:xfrm>
-            <a:off x="0" y="2039589"/>
-            <a:ext cx="12192000" cy="2778822"/>
+            <a:off x="0" y="1866016"/>
+            <a:ext cx="12192000" cy="3125968"/>
           </a:xfrm>
           <a:prstGeom prst="rect">
             <a:avLst/>
@@ -5467,7 +5277,7 @@
     </p:spTree>
     <p:extLst>
       <p:ext uri="{BB962C8B-B14F-4D97-AF65-F5344CB8AC3E}">
-        <p14:creationId xmlns:p14="http://schemas.microsoft.com/office/powerpoint/2010/main" val="2551509566"/>
+        <p14:creationId xmlns:p14="http://schemas.microsoft.com/office/powerpoint/2010/main" val="3929183676"/>
       </p:ext>
     </p:extLst>
   </p:cSld>
@@ -5477,7 +5287,7 @@
 </p:sld>
 </file>
 
-<file path=ppt/slides/slide14.xml><?xml version="1.0" encoding="utf-8"?>
+<file path=ppt/slides/slide13.xml><?xml version="1.0" encoding="utf-8"?>
 <p:sld xmlns:a="http://schemas.openxmlformats.org/drawingml/2006/main" xmlns:r="http://schemas.openxmlformats.org/officeDocument/2006/relationships" xmlns:p="http://schemas.openxmlformats.org/presentationml/2006/main">
   <p:cSld>
     <p:bg>
@@ -5656,7 +5466,7 @@
                 <a:ea typeface="+mj-ea"/>
                 <a:cs typeface="+mj-cs"/>
               </a:rPr>
-              <a:t>CU-ASIGNAR TAREAS Y SUBTAREAS</a:t>
+              <a:t>CU-DEFINIR SUBTAREAS</a:t>
             </a:r>
           </a:p>
         </p:txBody>
@@ -5666,7 +5476,7 @@
           <p:cNvPr id="3" name="Imagen 2" descr="Diagrama&#10;&#10;Descripción generada automáticamente">
             <a:extLst>
               <a:ext uri="{FF2B5EF4-FFF2-40B4-BE49-F238E27FC236}">
-                <a16:creationId xmlns:a16="http://schemas.microsoft.com/office/drawing/2014/main" id="{C084CCE0-6D1D-2EB2-A7EB-A27AFA2B2385}"/>
+                <a16:creationId xmlns:a16="http://schemas.microsoft.com/office/drawing/2014/main" id="{E5552AC8-290F-805F-DED2-796AB4F78878}"/>
               </a:ext>
             </a:extLst>
           </p:cNvPr>
@@ -5689,8 +5499,8 @@
         </p:blipFill>
         <p:spPr>
           <a:xfrm>
-            <a:off x="885825" y="2067242"/>
-            <a:ext cx="10420350" cy="4105275"/>
+            <a:off x="569937" y="2351087"/>
+            <a:ext cx="10878478" cy="2993073"/>
           </a:xfrm>
           <a:prstGeom prst="rect">
             <a:avLst/>
@@ -5700,7 +5510,7 @@
     </p:spTree>
     <p:extLst>
       <p:ext uri="{BB962C8B-B14F-4D97-AF65-F5344CB8AC3E}">
-        <p14:creationId xmlns:p14="http://schemas.microsoft.com/office/powerpoint/2010/main" val="1703084928"/>
+        <p14:creationId xmlns:p14="http://schemas.microsoft.com/office/powerpoint/2010/main" val="624219451"/>
       </p:ext>
     </p:extLst>
   </p:cSld>
@@ -5710,7 +5520,7 @@
 </p:sld>
 </file>
 
-<file path=ppt/slides/slide15.xml><?xml version="1.0" encoding="utf-8"?>
+<file path=ppt/slides/slide14.xml><?xml version="1.0" encoding="utf-8"?>
 <p:sld xmlns:a="http://schemas.openxmlformats.org/drawingml/2006/main" xmlns:r="http://schemas.openxmlformats.org/officeDocument/2006/relationships" xmlns:p="http://schemas.openxmlformats.org/presentationml/2006/main">
   <p:cSld>
     <p:spTree>
@@ -5732,7 +5542,7 @@
           <p:cNvPr id="3" name="Imagen 2" descr="Diagrama&#10;&#10;Descripción generada automáticamente">
             <a:extLst>
               <a:ext uri="{FF2B5EF4-FFF2-40B4-BE49-F238E27FC236}">
-                <a16:creationId xmlns:a16="http://schemas.microsoft.com/office/drawing/2014/main" id="{378B6ED6-3208-E92B-E033-E34F83051268}"/>
+                <a16:creationId xmlns:a16="http://schemas.microsoft.com/office/drawing/2014/main" id="{4373A81C-5B4A-D367-C096-447BDABB0297}"/>
               </a:ext>
             </a:extLst>
           </p:cNvPr>
@@ -5755,44 +5565,8 @@
         </p:blipFill>
         <p:spPr>
           <a:xfrm>
-            <a:off x="0" y="1769681"/>
-            <a:ext cx="12192000" cy="3318638"/>
-          </a:xfrm>
-          <a:prstGeom prst="rect">
-            <a:avLst/>
-          </a:prstGeom>
-        </p:spPr>
-      </p:pic>
-      <p:pic>
-        <p:nvPicPr>
-          <p:cNvPr id="5" name="Imagen 4" descr="Diagrama&#10;&#10;Descripción generada automáticamente">
-            <a:extLst>
-              <a:ext uri="{FF2B5EF4-FFF2-40B4-BE49-F238E27FC236}">
-                <a16:creationId xmlns:a16="http://schemas.microsoft.com/office/drawing/2014/main" id="{8806C686-FE35-9123-030F-C7D05B6E3A73}"/>
-              </a:ext>
-            </a:extLst>
-          </p:cNvPr>
-          <p:cNvPicPr>
-            <a:picLocks noChangeAspect="1"/>
-          </p:cNvPicPr>
-          <p:nvPr/>
-        </p:nvPicPr>
-        <p:blipFill>
-          <a:blip r:embed="rId2">
-            <a:extLst>
-              <a:ext uri="{28A0092B-C50C-407E-A947-70E740481C1C}">
-                <a14:useLocalDpi xmlns:a14="http://schemas.microsoft.com/office/drawing/2010/main" val="0"/>
-              </a:ext>
-            </a:extLst>
-          </a:blip>
-          <a:stretch>
-            <a:fillRect/>
-          </a:stretch>
-        </p:blipFill>
-        <p:spPr>
-          <a:xfrm>
-            <a:off x="0" y="1769681"/>
-            <a:ext cx="12192000" cy="3318638"/>
+            <a:off x="0" y="2039589"/>
+            <a:ext cx="12192000" cy="2778822"/>
           </a:xfrm>
           <a:prstGeom prst="rect">
             <a:avLst/>
@@ -5802,7 +5576,7 @@
     </p:spTree>
     <p:extLst>
       <p:ext uri="{BB962C8B-B14F-4D97-AF65-F5344CB8AC3E}">
-        <p14:creationId xmlns:p14="http://schemas.microsoft.com/office/powerpoint/2010/main" val="3244957298"/>
+        <p14:creationId xmlns:p14="http://schemas.microsoft.com/office/powerpoint/2010/main" val="2551509566"/>
       </p:ext>
     </p:extLst>
   </p:cSld>
@@ -5812,7 +5586,7 @@
 </p:sld>
 </file>
 
-<file path=ppt/slides/slide16.xml><?xml version="1.0" encoding="utf-8"?>
+<file path=ppt/slides/slide15.xml><?xml version="1.0" encoding="utf-8"?>
 <p:sld xmlns:a="http://schemas.openxmlformats.org/drawingml/2006/main" xmlns:r="http://schemas.openxmlformats.org/officeDocument/2006/relationships" xmlns:p="http://schemas.openxmlformats.org/presentationml/2006/main">
   <p:cSld>
     <p:bg>
@@ -5991,17 +5765,17 @@
                 <a:ea typeface="+mj-ea"/>
                 <a:cs typeface="+mj-cs"/>
               </a:rPr>
-              <a:t>CU-GESTIONAR FECHAS LIMITE</a:t>
+              <a:t>CU-ASIGNAR TAREAS Y SUBTAREAS</a:t>
             </a:r>
           </a:p>
         </p:txBody>
       </p:sp>
       <p:pic>
         <p:nvPicPr>
-          <p:cNvPr id="3" name="Imagen 2" descr="Imagen que contiene Diagrama&#10;&#10;Descripción generada automáticamente">
-            <a:extLst>
-              <a:ext uri="{FF2B5EF4-FFF2-40B4-BE49-F238E27FC236}">
-                <a16:creationId xmlns:a16="http://schemas.microsoft.com/office/drawing/2014/main" id="{D90294CC-298C-CC3D-21D3-E1D17B8BF865}"/>
+          <p:cNvPr id="3" name="Imagen 2" descr="Diagrama&#10;&#10;Descripción generada automáticamente">
+            <a:extLst>
+              <a:ext uri="{FF2B5EF4-FFF2-40B4-BE49-F238E27FC236}">
+                <a16:creationId xmlns:a16="http://schemas.microsoft.com/office/drawing/2014/main" id="{C084CCE0-6D1D-2EB2-A7EB-A27AFA2B2385}"/>
               </a:ext>
             </a:extLst>
           </p:cNvPr>
@@ -6010,7 +5784,7 @@
           </p:cNvPicPr>
           <p:nvPr/>
         </p:nvPicPr>
-        <p:blipFill rotWithShape="1">
+        <p:blipFill>
           <a:blip r:embed="rId2">
             <a:extLst>
               <a:ext uri="{28A0092B-C50C-407E-A947-70E740481C1C}">
@@ -6018,13 +5792,14 @@
               </a:ext>
             </a:extLst>
           </a:blip>
-          <a:srcRect b="55032"/>
-          <a:stretch/>
+          <a:stretch>
+            <a:fillRect/>
+          </a:stretch>
         </p:blipFill>
         <p:spPr>
           <a:xfrm>
-            <a:off x="2259774" y="1921442"/>
-            <a:ext cx="7227545" cy="3961198"/>
+            <a:off x="885825" y="2067242"/>
+            <a:ext cx="10420350" cy="4105275"/>
           </a:xfrm>
           <a:prstGeom prst="rect">
             <a:avLst/>
@@ -6034,7 +5809,7 @@
     </p:spTree>
     <p:extLst>
       <p:ext uri="{BB962C8B-B14F-4D97-AF65-F5344CB8AC3E}">
-        <p14:creationId xmlns:p14="http://schemas.microsoft.com/office/powerpoint/2010/main" val="1103161025"/>
+        <p14:creationId xmlns:p14="http://schemas.microsoft.com/office/powerpoint/2010/main" val="1703084928"/>
       </p:ext>
     </p:extLst>
   </p:cSld>
@@ -6044,7 +5819,7 @@
 </p:sld>
 </file>
 
-<file path=ppt/slides/slide17.xml><?xml version="1.0" encoding="utf-8"?>
+<file path=ppt/slides/slide16.xml><?xml version="1.0" encoding="utf-8"?>
 <p:sld xmlns:a="http://schemas.openxmlformats.org/drawingml/2006/main" xmlns:r="http://schemas.openxmlformats.org/officeDocument/2006/relationships" xmlns:p="http://schemas.openxmlformats.org/presentationml/2006/main">
   <p:cSld>
     <p:spTree>
@@ -6063,10 +5838,10 @@
       </p:grpSpPr>
       <p:pic>
         <p:nvPicPr>
-          <p:cNvPr id="4" name="Imagen 3" descr="Diagrama&#10;&#10;Descripción generada automáticamente">
-            <a:extLst>
-              <a:ext uri="{FF2B5EF4-FFF2-40B4-BE49-F238E27FC236}">
-                <a16:creationId xmlns:a16="http://schemas.microsoft.com/office/drawing/2014/main" id="{98C672D1-C35A-AF9F-85E2-3EE58B0EB711}"/>
+          <p:cNvPr id="3" name="Imagen 2" descr="Diagrama&#10;&#10;Descripción generada automáticamente">
+            <a:extLst>
+              <a:ext uri="{FF2B5EF4-FFF2-40B4-BE49-F238E27FC236}">
+                <a16:creationId xmlns:a16="http://schemas.microsoft.com/office/drawing/2014/main" id="{378B6ED6-3208-E92B-E033-E34F83051268}"/>
               </a:ext>
             </a:extLst>
           </p:cNvPr>
@@ -6089,8 +5864,44 @@
         </p:blipFill>
         <p:spPr>
           <a:xfrm>
-            <a:off x="1455200" y="883602"/>
-            <a:ext cx="9281600" cy="5090796"/>
+            <a:off x="0" y="1769681"/>
+            <a:ext cx="12192000" cy="3318638"/>
+          </a:xfrm>
+          <a:prstGeom prst="rect">
+            <a:avLst/>
+          </a:prstGeom>
+        </p:spPr>
+      </p:pic>
+      <p:pic>
+        <p:nvPicPr>
+          <p:cNvPr id="5" name="Imagen 4" descr="Diagrama&#10;&#10;Descripción generada automáticamente">
+            <a:extLst>
+              <a:ext uri="{FF2B5EF4-FFF2-40B4-BE49-F238E27FC236}">
+                <a16:creationId xmlns:a16="http://schemas.microsoft.com/office/drawing/2014/main" id="{8806C686-FE35-9123-030F-C7D05B6E3A73}"/>
+              </a:ext>
+            </a:extLst>
+          </p:cNvPr>
+          <p:cNvPicPr>
+            <a:picLocks noChangeAspect="1"/>
+          </p:cNvPicPr>
+          <p:nvPr/>
+        </p:nvPicPr>
+        <p:blipFill>
+          <a:blip r:embed="rId2">
+            <a:extLst>
+              <a:ext uri="{28A0092B-C50C-407E-A947-70E740481C1C}">
+                <a14:useLocalDpi xmlns:a14="http://schemas.microsoft.com/office/drawing/2010/main" val="0"/>
+              </a:ext>
+            </a:extLst>
+          </a:blip>
+          <a:stretch>
+            <a:fillRect/>
+          </a:stretch>
+        </p:blipFill>
+        <p:spPr>
+          <a:xfrm>
+            <a:off x="0" y="1769681"/>
+            <a:ext cx="12192000" cy="3318638"/>
           </a:xfrm>
           <a:prstGeom prst="rect">
             <a:avLst/>
@@ -6100,7 +5911,7 @@
     </p:spTree>
     <p:extLst>
       <p:ext uri="{BB962C8B-B14F-4D97-AF65-F5344CB8AC3E}">
-        <p14:creationId xmlns:p14="http://schemas.microsoft.com/office/powerpoint/2010/main" val="4293089064"/>
+        <p14:creationId xmlns:p14="http://schemas.microsoft.com/office/powerpoint/2010/main" val="3244957298"/>
       </p:ext>
     </p:extLst>
   </p:cSld>
@@ -6110,7 +5921,7 @@
 </p:sld>
 </file>
 
-<file path=ppt/slides/slide18.xml><?xml version="1.0" encoding="utf-8"?>
+<file path=ppt/slides/slide17.xml><?xml version="1.0" encoding="utf-8"?>
 <p:sld xmlns:a="http://schemas.openxmlformats.org/drawingml/2006/main" xmlns:r="http://schemas.openxmlformats.org/officeDocument/2006/relationships" xmlns:p="http://schemas.openxmlformats.org/presentationml/2006/main">
   <p:cSld>
     <p:bg>
@@ -6289,7 +6100,7 @@
                 <a:ea typeface="+mj-ea"/>
                 <a:cs typeface="+mj-cs"/>
               </a:rPr>
-              <a:t>CU-GENERAR REPORTES DEL ESTADO</a:t>
+              <a:t>CU-GESTIONAR FECHAS LIMITE</a:t>
             </a:r>
           </a:p>
         </p:txBody>
@@ -6299,7 +6110,7 @@
           <p:cNvPr id="3" name="Imagen 2" descr="Imagen que contiene Diagrama&#10;&#10;Descripción generada automáticamente">
             <a:extLst>
               <a:ext uri="{FF2B5EF4-FFF2-40B4-BE49-F238E27FC236}">
-                <a16:creationId xmlns:a16="http://schemas.microsoft.com/office/drawing/2014/main" id="{55D9AC76-4B43-B9FF-0F0C-3A1747B9821B}"/>
+                <a16:creationId xmlns:a16="http://schemas.microsoft.com/office/drawing/2014/main" id="{D90294CC-298C-CC3D-21D3-E1D17B8BF865}"/>
               </a:ext>
             </a:extLst>
           </p:cNvPr>
@@ -6316,13 +6127,13 @@
               </a:ext>
             </a:extLst>
           </a:blip>
-          <a:srcRect b="48994"/>
+          <a:srcRect b="55032"/>
           <a:stretch/>
         </p:blipFill>
         <p:spPr>
           <a:xfrm>
-            <a:off x="2882089" y="1964243"/>
-            <a:ext cx="6427821" cy="3990031"/>
+            <a:off x="2259774" y="1921442"/>
+            <a:ext cx="7227545" cy="3961198"/>
           </a:xfrm>
           <a:prstGeom prst="rect">
             <a:avLst/>
@@ -6332,7 +6143,7 @@
     </p:spTree>
     <p:extLst>
       <p:ext uri="{BB962C8B-B14F-4D97-AF65-F5344CB8AC3E}">
-        <p14:creationId xmlns:p14="http://schemas.microsoft.com/office/powerpoint/2010/main" val="1845685828"/>
+        <p14:creationId xmlns:p14="http://schemas.microsoft.com/office/powerpoint/2010/main" val="1103161025"/>
       </p:ext>
     </p:extLst>
   </p:cSld>
@@ -6342,7 +6153,7 @@
 </p:sld>
 </file>
 
-<file path=ppt/slides/slide19.xml><?xml version="1.0" encoding="utf-8"?>
+<file path=ppt/slides/slide18.xml><?xml version="1.0" encoding="utf-8"?>
 <p:sld xmlns:a="http://schemas.openxmlformats.org/drawingml/2006/main" xmlns:r="http://schemas.openxmlformats.org/officeDocument/2006/relationships" xmlns:p="http://schemas.openxmlformats.org/presentationml/2006/main">
   <p:cSld>
     <p:spTree>
@@ -6361,10 +6172,10 @@
       </p:grpSpPr>
       <p:pic>
         <p:nvPicPr>
-          <p:cNvPr id="3" name="Imagen 2" descr="Diagrama&#10;&#10;Descripción generada automáticamente">
-            <a:extLst>
-              <a:ext uri="{FF2B5EF4-FFF2-40B4-BE49-F238E27FC236}">
-                <a16:creationId xmlns:a16="http://schemas.microsoft.com/office/drawing/2014/main" id="{90AF0100-E89C-5FCE-CB75-447F5018F9B0}"/>
+          <p:cNvPr id="4" name="Imagen 3" descr="Diagrama&#10;&#10;Descripción generada automáticamente">
+            <a:extLst>
+              <a:ext uri="{FF2B5EF4-FFF2-40B4-BE49-F238E27FC236}">
+                <a16:creationId xmlns:a16="http://schemas.microsoft.com/office/drawing/2014/main" id="{98C672D1-C35A-AF9F-85E2-3EE58B0EB711}"/>
               </a:ext>
             </a:extLst>
           </p:cNvPr>
@@ -6387,8 +6198,8 @@
         </p:blipFill>
         <p:spPr>
           <a:xfrm>
-            <a:off x="3599168" y="0"/>
-            <a:ext cx="4993663" cy="6858000"/>
+            <a:off x="1455200" y="883602"/>
+            <a:ext cx="9281600" cy="5090796"/>
           </a:xfrm>
           <a:prstGeom prst="rect">
             <a:avLst/>
@@ -6398,12 +6209,244 @@
     </p:spTree>
     <p:extLst>
       <p:ext uri="{BB962C8B-B14F-4D97-AF65-F5344CB8AC3E}">
-        <p14:creationId xmlns:p14="http://schemas.microsoft.com/office/powerpoint/2010/main" val="1317102184"/>
+        <p14:creationId xmlns:p14="http://schemas.microsoft.com/office/powerpoint/2010/main" val="4293089064"/>
       </p:ext>
     </p:extLst>
   </p:cSld>
   <p:clrMapOvr>
     <a:masterClrMapping/>
+  </p:clrMapOvr>
+</p:sld>
+</file>
+
+<file path=ppt/slides/slide19.xml><?xml version="1.0" encoding="utf-8"?>
+<p:sld xmlns:a="http://schemas.openxmlformats.org/drawingml/2006/main" xmlns:r="http://schemas.openxmlformats.org/officeDocument/2006/relationships" xmlns:p="http://schemas.openxmlformats.org/presentationml/2006/main">
+  <p:cSld>
+    <p:bg>
+      <p:bgPr>
+        <a:solidFill>
+          <a:schemeClr val="bg2"/>
+        </a:solidFill>
+        <a:effectLst/>
+      </p:bgPr>
+    </p:bg>
+    <p:spTree>
+      <p:nvGrpSpPr>
+        <p:cNvPr id="1" name=""/>
+        <p:cNvGrpSpPr/>
+        <p:nvPr/>
+      </p:nvGrpSpPr>
+      <p:grpSpPr>
+        <a:xfrm>
+          <a:off x="0" y="0"/>
+          <a:ext cx="0" cy="0"/>
+          <a:chOff x="0" y="0"/>
+          <a:chExt cx="0" cy="0"/>
+        </a:xfrm>
+      </p:grpSpPr>
+      <p:sp>
+        <p:nvSpPr>
+          <p:cNvPr id="9" name="Rectangle 8">
+            <a:extLst>
+              <a:ext uri="{FF2B5EF4-FFF2-40B4-BE49-F238E27FC236}">
+                <a16:creationId xmlns:a16="http://schemas.microsoft.com/office/drawing/2014/main" id="{10F24D38-B79E-44B4-830E-043F45D96DC2}"/>
+              </a:ext>
+              <a:ext uri="{C183D7F6-B498-43B3-948B-1728B52AA6E4}">
+                <adec:decorative xmlns:adec="http://schemas.microsoft.com/office/drawing/2017/decorative" val="1"/>
+              </a:ext>
+            </a:extLst>
+          </p:cNvPr>
+          <p:cNvSpPr>
+            <a:spLocks noGrp="1" noRot="1" noChangeAspect="1" noMove="1" noResize="1" noEditPoints="1" noAdjustHandles="1" noChangeArrowheads="1" noChangeShapeType="1" noTextEdit="1"/>
+          </p:cNvSpPr>
+          <p:nvPr>
+            <p:extLst>
+              <p:ext uri="{386F3935-93C4-4BCD-93E2-E3B085C9AB24}">
+                <p16:designElem xmlns:p16="http://schemas.microsoft.com/office/powerpoint/2015/main" val="1"/>
+              </p:ext>
+            </p:extLst>
+          </p:nvPr>
+        </p:nvSpPr>
+        <p:spPr>
+          <a:xfrm>
+            <a:off x="0" y="0"/>
+            <a:ext cx="12192000" cy="6858000"/>
+          </a:xfrm>
+          <a:prstGeom prst="rect">
+            <a:avLst/>
+          </a:prstGeom>
+          <a:solidFill>
+            <a:schemeClr val="accent1"/>
+          </a:solidFill>
+          <a:ln>
+            <a:noFill/>
+          </a:ln>
+        </p:spPr>
+        <p:style>
+          <a:lnRef idx="2">
+            <a:schemeClr val="accent1">
+              <a:shade val="50000"/>
+            </a:schemeClr>
+          </a:lnRef>
+          <a:fillRef idx="1">
+            <a:schemeClr val="accent1"/>
+          </a:fillRef>
+          <a:effectRef idx="0">
+            <a:schemeClr val="accent1"/>
+          </a:effectRef>
+          <a:fontRef idx="minor">
+            <a:schemeClr val="lt1"/>
+          </a:fontRef>
+        </p:style>
+        <p:txBody>
+          <a:bodyPr rtlCol="0" anchor="ctr"/>
+          <a:lstStyle/>
+          <a:p>
+            <a:pPr algn="ctr"/>
+            <a:endParaRPr lang="en-US"/>
+          </a:p>
+        </p:txBody>
+      </p:sp>
+      <p:cxnSp>
+        <p:nvCxnSpPr>
+          <p:cNvPr id="11" name="Straight Connector 10">
+            <a:extLst>
+              <a:ext uri="{FF2B5EF4-FFF2-40B4-BE49-F238E27FC236}">
+                <a16:creationId xmlns:a16="http://schemas.microsoft.com/office/drawing/2014/main" id="{FC469874-256B-45B3-A79C-7591B4BA1ECC}"/>
+              </a:ext>
+              <a:ext uri="{C183D7F6-B498-43B3-948B-1728B52AA6E4}">
+                <adec:decorative xmlns:adec="http://schemas.microsoft.com/office/drawing/2017/decorative" val="1"/>
+              </a:ext>
+            </a:extLst>
+          </p:cNvPr>
+          <p:cNvCxnSpPr>
+            <a:cxnSpLocks noGrp="1" noRot="1" noChangeAspect="1" noMove="1" noResize="1" noEditPoints="1" noAdjustHandles="1" noChangeArrowheads="1" noChangeShapeType="1"/>
+          </p:cNvCxnSpPr>
+          <p:nvPr>
+            <p:extLst>
+              <p:ext uri="{386F3935-93C4-4BCD-93E2-E3B085C9AB24}">
+                <p16:designElem xmlns:p16="http://schemas.microsoft.com/office/powerpoint/2015/main" val="1"/>
+              </p:ext>
+            </p:extLst>
+          </p:nvPr>
+        </p:nvCxnSpPr>
+        <p:spPr>
+          <a:xfrm flipV="1">
+            <a:off x="762000" y="826324"/>
+            <a:ext cx="0" cy="914400"/>
+          </a:xfrm>
+          <a:prstGeom prst="line">
+            <a:avLst/>
+          </a:prstGeom>
+          <a:ln w="19050">
+            <a:solidFill>
+              <a:srgbClr val="FFFFFF">
+                <a:alpha val="80000"/>
+              </a:srgbClr>
+            </a:solidFill>
+          </a:ln>
+        </p:spPr>
+        <p:style>
+          <a:lnRef idx="1">
+            <a:schemeClr val="accent1"/>
+          </a:lnRef>
+          <a:fillRef idx="0">
+            <a:schemeClr val="accent1"/>
+          </a:fillRef>
+          <a:effectRef idx="0">
+            <a:schemeClr val="accent1"/>
+          </a:effectRef>
+          <a:fontRef idx="minor">
+            <a:schemeClr val="tx1"/>
+          </a:fontRef>
+        </p:style>
+      </p:cxnSp>
+      <p:sp>
+        <p:nvSpPr>
+          <p:cNvPr id="10" name="Título 1">
+            <a:extLst>
+              <a:ext uri="{FF2B5EF4-FFF2-40B4-BE49-F238E27FC236}">
+                <a16:creationId xmlns:a16="http://schemas.microsoft.com/office/drawing/2014/main" id="{09594B29-7ACF-600D-9D79-2A598A95B9ED}"/>
+              </a:ext>
+            </a:extLst>
+          </p:cNvPr>
+          <p:cNvSpPr>
+            <a:spLocks noGrp="1"/>
+          </p:cNvSpPr>
+          <p:nvPr>
+            <p:ph type="title"/>
+          </p:nvPr>
+        </p:nvSpPr>
+        <p:spPr>
+          <a:xfrm>
+            <a:off x="690665" y="818985"/>
+            <a:ext cx="10186602" cy="921740"/>
+          </a:xfrm>
+        </p:spPr>
+        <p:txBody>
+          <a:bodyPr vert="horz" lIns="91440" tIns="45720" rIns="91440" bIns="45720" rtlCol="0" anchor="b">
+            <a:normAutofit/>
+          </a:bodyPr>
+          <a:lstStyle/>
+          <a:p>
+            <a:r>
+              <a:rPr lang="en-US" sz="4800" kern="1200" dirty="0">
+                <a:solidFill>
+                  <a:srgbClr val="FFFFFF"/>
+                </a:solidFill>
+                <a:latin typeface="+mj-lt"/>
+                <a:ea typeface="+mj-ea"/>
+                <a:cs typeface="+mj-cs"/>
+              </a:rPr>
+              <a:t>CU-GENERAR REPORTES DEL ESTADO</a:t>
+            </a:r>
+          </a:p>
+        </p:txBody>
+      </p:sp>
+      <p:pic>
+        <p:nvPicPr>
+          <p:cNvPr id="3" name="Imagen 2" descr="Imagen que contiene Diagrama&#10;&#10;Descripción generada automáticamente">
+            <a:extLst>
+              <a:ext uri="{FF2B5EF4-FFF2-40B4-BE49-F238E27FC236}">
+                <a16:creationId xmlns:a16="http://schemas.microsoft.com/office/drawing/2014/main" id="{55D9AC76-4B43-B9FF-0F0C-3A1747B9821B}"/>
+              </a:ext>
+            </a:extLst>
+          </p:cNvPr>
+          <p:cNvPicPr>
+            <a:picLocks noChangeAspect="1"/>
+          </p:cNvPicPr>
+          <p:nvPr/>
+        </p:nvPicPr>
+        <p:blipFill rotWithShape="1">
+          <a:blip r:embed="rId2">
+            <a:extLst>
+              <a:ext uri="{28A0092B-C50C-407E-A947-70E740481C1C}">
+                <a14:useLocalDpi xmlns:a14="http://schemas.microsoft.com/office/drawing/2010/main" val="0"/>
+              </a:ext>
+            </a:extLst>
+          </a:blip>
+          <a:srcRect b="48994"/>
+          <a:stretch/>
+        </p:blipFill>
+        <p:spPr>
+          <a:xfrm>
+            <a:off x="2882089" y="1964243"/>
+            <a:ext cx="6427821" cy="3990031"/>
+          </a:xfrm>
+          <a:prstGeom prst="rect">
+            <a:avLst/>
+          </a:prstGeom>
+        </p:spPr>
+      </p:pic>
+    </p:spTree>
+    <p:extLst>
+      <p:ext uri="{BB962C8B-B14F-4D97-AF65-F5344CB8AC3E}">
+        <p14:creationId xmlns:p14="http://schemas.microsoft.com/office/powerpoint/2010/main" val="1845685828"/>
+      </p:ext>
+    </p:extLst>
+  </p:cSld>
+  <p:clrMapOvr>
+    <a:overrideClrMapping bg1="dk1" tx1="lt1" bg2="dk2" tx2="lt2" accent1="accent1" accent2="accent2" accent3="accent3" accent4="accent4" accent5="accent5" accent6="accent6" hlink="hlink" folHlink="folHlink"/>
   </p:clrMapOvr>
 </p:sld>
 </file>
@@ -7149,238 +7192,6 @@
 <file path=ppt/slides/slide20.xml><?xml version="1.0" encoding="utf-8"?>
 <p:sld xmlns:a="http://schemas.openxmlformats.org/drawingml/2006/main" xmlns:r="http://schemas.openxmlformats.org/officeDocument/2006/relationships" xmlns:p="http://schemas.openxmlformats.org/presentationml/2006/main">
   <p:cSld>
-    <p:bg>
-      <p:bgPr>
-        <a:solidFill>
-          <a:schemeClr val="bg2"/>
-        </a:solidFill>
-        <a:effectLst/>
-      </p:bgPr>
-    </p:bg>
-    <p:spTree>
-      <p:nvGrpSpPr>
-        <p:cNvPr id="1" name=""/>
-        <p:cNvGrpSpPr/>
-        <p:nvPr/>
-      </p:nvGrpSpPr>
-      <p:grpSpPr>
-        <a:xfrm>
-          <a:off x="0" y="0"/>
-          <a:ext cx="0" cy="0"/>
-          <a:chOff x="0" y="0"/>
-          <a:chExt cx="0" cy="0"/>
-        </a:xfrm>
-      </p:grpSpPr>
-      <p:sp>
-        <p:nvSpPr>
-          <p:cNvPr id="9" name="Rectangle 8">
-            <a:extLst>
-              <a:ext uri="{FF2B5EF4-FFF2-40B4-BE49-F238E27FC236}">
-                <a16:creationId xmlns:a16="http://schemas.microsoft.com/office/drawing/2014/main" id="{10F24D38-B79E-44B4-830E-043F45D96DC2}"/>
-              </a:ext>
-              <a:ext uri="{C183D7F6-B498-43B3-948B-1728B52AA6E4}">
-                <adec:decorative xmlns:adec="http://schemas.microsoft.com/office/drawing/2017/decorative" val="1"/>
-              </a:ext>
-            </a:extLst>
-          </p:cNvPr>
-          <p:cNvSpPr>
-            <a:spLocks noGrp="1" noRot="1" noChangeAspect="1" noMove="1" noResize="1" noEditPoints="1" noAdjustHandles="1" noChangeArrowheads="1" noChangeShapeType="1" noTextEdit="1"/>
-          </p:cNvSpPr>
-          <p:nvPr>
-            <p:extLst>
-              <p:ext uri="{386F3935-93C4-4BCD-93E2-E3B085C9AB24}">
-                <p16:designElem xmlns:p16="http://schemas.microsoft.com/office/powerpoint/2015/main" val="1"/>
-              </p:ext>
-            </p:extLst>
-          </p:nvPr>
-        </p:nvSpPr>
-        <p:spPr>
-          <a:xfrm>
-            <a:off x="0" y="0"/>
-            <a:ext cx="12192000" cy="6858000"/>
-          </a:xfrm>
-          <a:prstGeom prst="rect">
-            <a:avLst/>
-          </a:prstGeom>
-          <a:solidFill>
-            <a:schemeClr val="accent1"/>
-          </a:solidFill>
-          <a:ln>
-            <a:noFill/>
-          </a:ln>
-        </p:spPr>
-        <p:style>
-          <a:lnRef idx="2">
-            <a:schemeClr val="accent1">
-              <a:shade val="50000"/>
-            </a:schemeClr>
-          </a:lnRef>
-          <a:fillRef idx="1">
-            <a:schemeClr val="accent1"/>
-          </a:fillRef>
-          <a:effectRef idx="0">
-            <a:schemeClr val="accent1"/>
-          </a:effectRef>
-          <a:fontRef idx="minor">
-            <a:schemeClr val="lt1"/>
-          </a:fontRef>
-        </p:style>
-        <p:txBody>
-          <a:bodyPr rtlCol="0" anchor="ctr"/>
-          <a:lstStyle/>
-          <a:p>
-            <a:pPr algn="ctr"/>
-            <a:endParaRPr lang="en-US"/>
-          </a:p>
-        </p:txBody>
-      </p:sp>
-      <p:cxnSp>
-        <p:nvCxnSpPr>
-          <p:cNvPr id="11" name="Straight Connector 10">
-            <a:extLst>
-              <a:ext uri="{FF2B5EF4-FFF2-40B4-BE49-F238E27FC236}">
-                <a16:creationId xmlns:a16="http://schemas.microsoft.com/office/drawing/2014/main" id="{FC469874-256B-45B3-A79C-7591B4BA1ECC}"/>
-              </a:ext>
-              <a:ext uri="{C183D7F6-B498-43B3-948B-1728B52AA6E4}">
-                <adec:decorative xmlns:adec="http://schemas.microsoft.com/office/drawing/2017/decorative" val="1"/>
-              </a:ext>
-            </a:extLst>
-          </p:cNvPr>
-          <p:cNvCxnSpPr>
-            <a:cxnSpLocks noGrp="1" noRot="1" noChangeAspect="1" noMove="1" noResize="1" noEditPoints="1" noAdjustHandles="1" noChangeArrowheads="1" noChangeShapeType="1"/>
-          </p:cNvCxnSpPr>
-          <p:nvPr>
-            <p:extLst>
-              <p:ext uri="{386F3935-93C4-4BCD-93E2-E3B085C9AB24}">
-                <p16:designElem xmlns:p16="http://schemas.microsoft.com/office/powerpoint/2015/main" val="1"/>
-              </p:ext>
-            </p:extLst>
-          </p:nvPr>
-        </p:nvCxnSpPr>
-        <p:spPr>
-          <a:xfrm flipV="1">
-            <a:off x="762000" y="826324"/>
-            <a:ext cx="0" cy="914400"/>
-          </a:xfrm>
-          <a:prstGeom prst="line">
-            <a:avLst/>
-          </a:prstGeom>
-          <a:ln w="19050">
-            <a:solidFill>
-              <a:srgbClr val="FFFFFF">
-                <a:alpha val="80000"/>
-              </a:srgbClr>
-            </a:solidFill>
-          </a:ln>
-        </p:spPr>
-        <p:style>
-          <a:lnRef idx="1">
-            <a:schemeClr val="accent1"/>
-          </a:lnRef>
-          <a:fillRef idx="0">
-            <a:schemeClr val="accent1"/>
-          </a:fillRef>
-          <a:effectRef idx="0">
-            <a:schemeClr val="accent1"/>
-          </a:effectRef>
-          <a:fontRef idx="minor">
-            <a:schemeClr val="tx1"/>
-          </a:fontRef>
-        </p:style>
-      </p:cxnSp>
-      <p:sp>
-        <p:nvSpPr>
-          <p:cNvPr id="10" name="Título 1">
-            <a:extLst>
-              <a:ext uri="{FF2B5EF4-FFF2-40B4-BE49-F238E27FC236}">
-                <a16:creationId xmlns:a16="http://schemas.microsoft.com/office/drawing/2014/main" id="{09594B29-7ACF-600D-9D79-2A598A95B9ED}"/>
-              </a:ext>
-            </a:extLst>
-          </p:cNvPr>
-          <p:cNvSpPr>
-            <a:spLocks noGrp="1"/>
-          </p:cNvSpPr>
-          <p:nvPr>
-            <p:ph type="title"/>
-          </p:nvPr>
-        </p:nvSpPr>
-        <p:spPr>
-          <a:xfrm>
-            <a:off x="690665" y="818985"/>
-            <a:ext cx="10186602" cy="921740"/>
-          </a:xfrm>
-        </p:spPr>
-        <p:txBody>
-          <a:bodyPr vert="horz" lIns="91440" tIns="45720" rIns="91440" bIns="45720" rtlCol="0" anchor="b">
-            <a:normAutofit/>
-          </a:bodyPr>
-          <a:lstStyle/>
-          <a:p>
-            <a:r>
-              <a:rPr lang="en-US" sz="4800" kern="1200" dirty="0">
-                <a:solidFill>
-                  <a:srgbClr val="FFFFFF"/>
-                </a:solidFill>
-                <a:latin typeface="+mj-lt"/>
-                <a:ea typeface="+mj-ea"/>
-                <a:cs typeface="+mj-cs"/>
-              </a:rPr>
-              <a:t>CU-VISUALIZAR FECHAS LIMITE</a:t>
-            </a:r>
-          </a:p>
-        </p:txBody>
-      </p:sp>
-      <p:pic>
-        <p:nvPicPr>
-          <p:cNvPr id="2" name="Imagen 1" descr="Imagen que contiene Diagrama&#10;&#10;Descripción generada automáticamente">
-            <a:extLst>
-              <a:ext uri="{FF2B5EF4-FFF2-40B4-BE49-F238E27FC236}">
-                <a16:creationId xmlns:a16="http://schemas.microsoft.com/office/drawing/2014/main" id="{70D0E96A-8E86-2409-40D4-57E801284BC3}"/>
-              </a:ext>
-            </a:extLst>
-          </p:cNvPr>
-          <p:cNvPicPr>
-            <a:picLocks noChangeAspect="1"/>
-          </p:cNvPicPr>
-          <p:nvPr/>
-        </p:nvPicPr>
-        <p:blipFill rotWithShape="1">
-          <a:blip r:embed="rId2">
-            <a:extLst>
-              <a:ext uri="{28A0092B-C50C-407E-A947-70E740481C1C}">
-                <a14:useLocalDpi xmlns:a14="http://schemas.microsoft.com/office/drawing/2010/main" val="0"/>
-              </a:ext>
-            </a:extLst>
-          </a:blip>
-          <a:srcRect b="51852"/>
-          <a:stretch/>
-        </p:blipFill>
-        <p:spPr>
-          <a:xfrm>
-            <a:off x="2221796" y="1940560"/>
-            <a:ext cx="7135564" cy="4181206"/>
-          </a:xfrm>
-          <a:prstGeom prst="rect">
-            <a:avLst/>
-          </a:prstGeom>
-        </p:spPr>
-      </p:pic>
-    </p:spTree>
-    <p:extLst>
-      <p:ext uri="{BB962C8B-B14F-4D97-AF65-F5344CB8AC3E}">
-        <p14:creationId xmlns:p14="http://schemas.microsoft.com/office/powerpoint/2010/main" val="2567004864"/>
-      </p:ext>
-    </p:extLst>
-  </p:cSld>
-  <p:clrMapOvr>
-    <a:overrideClrMapping bg1="dk1" tx1="lt1" bg2="dk2" tx2="lt2" accent1="accent1" accent2="accent2" accent3="accent3" accent4="accent4" accent5="accent5" accent6="accent6" hlink="hlink" folHlink="folHlink"/>
-  </p:clrMapOvr>
-</p:sld>
-</file>
-
-<file path=ppt/slides/slide21.xml><?xml version="1.0" encoding="utf-8"?>
-<p:sld xmlns:a="http://schemas.openxmlformats.org/drawingml/2006/main" xmlns:r="http://schemas.openxmlformats.org/officeDocument/2006/relationships" xmlns:p="http://schemas.openxmlformats.org/presentationml/2006/main">
-  <p:cSld>
     <p:spTree>
       <p:nvGrpSpPr>
         <p:cNvPr id="1" name=""/>
@@ -7397,10 +7208,10 @@
       </p:grpSpPr>
       <p:pic>
         <p:nvPicPr>
-          <p:cNvPr id="2" name="Imagen 1" descr="Diagrama&#10;&#10;Descripción generada automáticamente">
-            <a:extLst>
-              <a:ext uri="{FF2B5EF4-FFF2-40B4-BE49-F238E27FC236}">
-                <a16:creationId xmlns:a16="http://schemas.microsoft.com/office/drawing/2014/main" id="{18B50445-90F7-7655-187A-5647AA517FD8}"/>
+          <p:cNvPr id="3" name="Imagen 2" descr="Diagrama&#10;&#10;Descripción generada automáticamente">
+            <a:extLst>
+              <a:ext uri="{FF2B5EF4-FFF2-40B4-BE49-F238E27FC236}">
+                <a16:creationId xmlns:a16="http://schemas.microsoft.com/office/drawing/2014/main" id="{90AF0100-E89C-5FCE-CB75-447F5018F9B0}"/>
               </a:ext>
             </a:extLst>
           </p:cNvPr>
@@ -7423,8 +7234,8 @@
         </p:blipFill>
         <p:spPr>
           <a:xfrm>
-            <a:off x="1452880" y="829390"/>
-            <a:ext cx="9479280" cy="5199220"/>
+            <a:off x="3599168" y="0"/>
+            <a:ext cx="4993663" cy="6858000"/>
           </a:xfrm>
           <a:prstGeom prst="rect">
             <a:avLst/>
@@ -7434,7 +7245,7 @@
     </p:spTree>
     <p:extLst>
       <p:ext uri="{BB962C8B-B14F-4D97-AF65-F5344CB8AC3E}">
-        <p14:creationId xmlns:p14="http://schemas.microsoft.com/office/powerpoint/2010/main" val="3797888960"/>
+        <p14:creationId xmlns:p14="http://schemas.microsoft.com/office/powerpoint/2010/main" val="1317102184"/>
       </p:ext>
     </p:extLst>
   </p:cSld>
@@ -7444,7 +7255,7 @@
 </p:sld>
 </file>
 
-<file path=ppt/slides/slide22.xml><?xml version="1.0" encoding="utf-8"?>
+<file path=ppt/slides/slide21.xml><?xml version="1.0" encoding="utf-8"?>
 <p:sld xmlns:a="http://schemas.openxmlformats.org/drawingml/2006/main" xmlns:r="http://schemas.openxmlformats.org/officeDocument/2006/relationships" xmlns:p="http://schemas.openxmlformats.org/presentationml/2006/main">
   <p:cSld>
     <p:bg>
@@ -7623,17 +7434,17 @@
                 <a:ea typeface="+mj-ea"/>
                 <a:cs typeface="+mj-cs"/>
               </a:rPr>
-              <a:t>CU-GESTIONAR AVANCE DE TAREAS</a:t>
+              <a:t>CU-VISUALIZAR FECHAS LIMITE</a:t>
             </a:r>
           </a:p>
         </p:txBody>
       </p:sp>
       <p:pic>
         <p:nvPicPr>
-          <p:cNvPr id="5" name="Imagen 4" descr="Diagrama&#10;&#10;Descripción generada automáticamente">
-            <a:extLst>
-              <a:ext uri="{FF2B5EF4-FFF2-40B4-BE49-F238E27FC236}">
-                <a16:creationId xmlns:a16="http://schemas.microsoft.com/office/drawing/2014/main" id="{6BE4C590-DDAF-FBB8-44DA-D6447ABBD2EF}"/>
+          <p:cNvPr id="2" name="Imagen 1" descr="Imagen que contiene Diagrama&#10;&#10;Descripción generada automáticamente">
+            <a:extLst>
+              <a:ext uri="{FF2B5EF4-FFF2-40B4-BE49-F238E27FC236}">
+                <a16:creationId xmlns:a16="http://schemas.microsoft.com/office/drawing/2014/main" id="{70D0E96A-8E86-2409-40D4-57E801284BC3}"/>
               </a:ext>
             </a:extLst>
           </p:cNvPr>
@@ -7642,7 +7453,7 @@
           </p:cNvPicPr>
           <p:nvPr/>
         </p:nvPicPr>
-        <p:blipFill>
+        <p:blipFill rotWithShape="1">
           <a:blip r:embed="rId2">
             <a:extLst>
               <a:ext uri="{28A0092B-C50C-407E-A947-70E740481C1C}">
@@ -7650,14 +7461,13 @@
               </a:ext>
             </a:extLst>
           </a:blip>
-          <a:stretch>
-            <a:fillRect/>
-          </a:stretch>
+          <a:srcRect b="51852"/>
+          <a:stretch/>
         </p:blipFill>
         <p:spPr>
           <a:xfrm>
-            <a:off x="828675" y="1995487"/>
-            <a:ext cx="10534650" cy="2867025"/>
+            <a:off x="2221796" y="1940560"/>
+            <a:ext cx="7135564" cy="4181206"/>
           </a:xfrm>
           <a:prstGeom prst="rect">
             <a:avLst/>
@@ -7667,7 +7477,7 @@
     </p:spTree>
     <p:extLst>
       <p:ext uri="{BB962C8B-B14F-4D97-AF65-F5344CB8AC3E}">
-        <p14:creationId xmlns:p14="http://schemas.microsoft.com/office/powerpoint/2010/main" val="3461120618"/>
+        <p14:creationId xmlns:p14="http://schemas.microsoft.com/office/powerpoint/2010/main" val="2567004864"/>
       </p:ext>
     </p:extLst>
   </p:cSld>
@@ -7677,7 +7487,7 @@
 </p:sld>
 </file>
 
-<file path=ppt/slides/slide23.xml><?xml version="1.0" encoding="utf-8"?>
+<file path=ppt/slides/slide22.xml><?xml version="1.0" encoding="utf-8"?>
 <p:sld xmlns:a="http://schemas.openxmlformats.org/drawingml/2006/main" xmlns:r="http://schemas.openxmlformats.org/officeDocument/2006/relationships" xmlns:p="http://schemas.openxmlformats.org/presentationml/2006/main">
   <p:cSld>
     <p:spTree>
@@ -7696,10 +7506,10 @@
       </p:grpSpPr>
       <p:pic>
         <p:nvPicPr>
-          <p:cNvPr id="5" name="Imagen 4" descr="Interfaz de usuario gráfica, Aplicación, Word&#10;&#10;Descripción generada automáticamente">
-            <a:extLst>
-              <a:ext uri="{FF2B5EF4-FFF2-40B4-BE49-F238E27FC236}">
-                <a16:creationId xmlns:a16="http://schemas.microsoft.com/office/drawing/2014/main" id="{54E84626-7079-A131-61F4-007C2F9F5896}"/>
+          <p:cNvPr id="2" name="Imagen 1" descr="Diagrama&#10;&#10;Descripción generada automáticamente">
+            <a:extLst>
+              <a:ext uri="{FF2B5EF4-FFF2-40B4-BE49-F238E27FC236}">
+                <a16:creationId xmlns:a16="http://schemas.microsoft.com/office/drawing/2014/main" id="{18B50445-90F7-7655-187A-5647AA517FD8}"/>
               </a:ext>
             </a:extLst>
           </p:cNvPr>
@@ -7722,8 +7532,8 @@
         </p:blipFill>
         <p:spPr>
           <a:xfrm>
-            <a:off x="0" y="2039589"/>
-            <a:ext cx="12192000" cy="2778822"/>
+            <a:off x="1452880" y="829390"/>
+            <a:ext cx="9479280" cy="5199220"/>
           </a:xfrm>
           <a:prstGeom prst="rect">
             <a:avLst/>
@@ -7733,7 +7543,7 @@
     </p:spTree>
     <p:extLst>
       <p:ext uri="{BB962C8B-B14F-4D97-AF65-F5344CB8AC3E}">
-        <p14:creationId xmlns:p14="http://schemas.microsoft.com/office/powerpoint/2010/main" val="2056960077"/>
+        <p14:creationId xmlns:p14="http://schemas.microsoft.com/office/powerpoint/2010/main" val="3797888960"/>
       </p:ext>
     </p:extLst>
   </p:cSld>
@@ -7743,7 +7553,7 @@
 </p:sld>
 </file>
 
-<file path=ppt/slides/slide24.xml><?xml version="1.0" encoding="utf-8"?>
+<file path=ppt/slides/slide23.xml><?xml version="1.0" encoding="utf-8"?>
 <p:sld xmlns:a="http://schemas.openxmlformats.org/drawingml/2006/main" xmlns:r="http://schemas.openxmlformats.org/officeDocument/2006/relationships" xmlns:p="http://schemas.openxmlformats.org/presentationml/2006/main">
   <p:cSld>
     <p:bg>
@@ -7909,7 +7719,7 @@
         </p:spPr>
         <p:txBody>
           <a:bodyPr vert="horz" lIns="91440" tIns="45720" rIns="91440" bIns="45720" rtlCol="0" anchor="b">
-            <a:normAutofit fontScale="90000"/>
+            <a:normAutofit/>
           </a:bodyPr>
           <a:lstStyle/>
           <a:p>
@@ -7922,7 +7732,7 @@
                 <a:ea typeface="+mj-ea"/>
                 <a:cs typeface="+mj-cs"/>
               </a:rPr>
-              <a:t>CU-ENVIAR NOTIFICACION Y RECORDATORIOS A LOS USUARIOS</a:t>
+              <a:t>CU-GESTIONAR AVANCE DE TAREAS</a:t>
             </a:r>
           </a:p>
         </p:txBody>
@@ -7932,7 +7742,7 @@
           <p:cNvPr id="5" name="Imagen 4" descr="Diagrama&#10;&#10;Descripción generada automáticamente">
             <a:extLst>
               <a:ext uri="{FF2B5EF4-FFF2-40B4-BE49-F238E27FC236}">
-                <a16:creationId xmlns:a16="http://schemas.microsoft.com/office/drawing/2014/main" id="{2F44CE3B-2B0D-7665-C288-EE52692A4272}"/>
+                <a16:creationId xmlns:a16="http://schemas.microsoft.com/office/drawing/2014/main" id="{6BE4C590-DDAF-FBB8-44DA-D6447ABBD2EF}"/>
               </a:ext>
             </a:extLst>
           </p:cNvPr>
@@ -7955,8 +7765,8 @@
         </p:blipFill>
         <p:spPr>
           <a:xfrm>
-            <a:off x="762000" y="2032762"/>
-            <a:ext cx="10204451" cy="4036189"/>
+            <a:off x="828675" y="1995487"/>
+            <a:ext cx="10534650" cy="2867025"/>
           </a:xfrm>
           <a:prstGeom prst="rect">
             <a:avLst/>
@@ -7966,7 +7776,7 @@
     </p:spTree>
     <p:extLst>
       <p:ext uri="{BB962C8B-B14F-4D97-AF65-F5344CB8AC3E}">
-        <p14:creationId xmlns:p14="http://schemas.microsoft.com/office/powerpoint/2010/main" val="3372768328"/>
+        <p14:creationId xmlns:p14="http://schemas.microsoft.com/office/powerpoint/2010/main" val="3461120618"/>
       </p:ext>
     </p:extLst>
   </p:cSld>
@@ -7976,7 +7786,7 @@
 </p:sld>
 </file>
 
-<file path=ppt/slides/slide25.xml><?xml version="1.0" encoding="utf-8"?>
+<file path=ppt/slides/slide24.xml><?xml version="1.0" encoding="utf-8"?>
 <p:sld xmlns:a="http://schemas.openxmlformats.org/drawingml/2006/main" xmlns:r="http://schemas.openxmlformats.org/officeDocument/2006/relationships" xmlns:p="http://schemas.openxmlformats.org/presentationml/2006/main">
   <p:cSld>
     <p:spTree>
@@ -7995,10 +7805,10 @@
       </p:grpSpPr>
       <p:pic>
         <p:nvPicPr>
-          <p:cNvPr id="3" name="Imagen 2" descr="Imagen que contiene Diagrama&#10;&#10;Descripción generada automáticamente">
-            <a:extLst>
-              <a:ext uri="{FF2B5EF4-FFF2-40B4-BE49-F238E27FC236}">
-                <a16:creationId xmlns:a16="http://schemas.microsoft.com/office/drawing/2014/main" id="{3706A896-F00D-50DB-08C2-9C09BC16BE85}"/>
+          <p:cNvPr id="5" name="Imagen 4" descr="Interfaz de usuario gráfica, Aplicación, Word&#10;&#10;Descripción generada automáticamente">
+            <a:extLst>
+              <a:ext uri="{FF2B5EF4-FFF2-40B4-BE49-F238E27FC236}">
+                <a16:creationId xmlns:a16="http://schemas.microsoft.com/office/drawing/2014/main" id="{54E84626-7079-A131-61F4-007C2F9F5896}"/>
               </a:ext>
             </a:extLst>
           </p:cNvPr>
@@ -8021,8 +7831,8 @@
         </p:blipFill>
         <p:spPr>
           <a:xfrm>
-            <a:off x="0" y="1452732"/>
-            <a:ext cx="12192000" cy="3952535"/>
+            <a:off x="0" y="2039589"/>
+            <a:ext cx="12192000" cy="2778822"/>
           </a:xfrm>
           <a:prstGeom prst="rect">
             <a:avLst/>
@@ -8032,7 +7842,7 @@
     </p:spTree>
     <p:extLst>
       <p:ext uri="{BB962C8B-B14F-4D97-AF65-F5344CB8AC3E}">
-        <p14:creationId xmlns:p14="http://schemas.microsoft.com/office/powerpoint/2010/main" val="1895994895"/>
+        <p14:creationId xmlns:p14="http://schemas.microsoft.com/office/powerpoint/2010/main" val="2056960077"/>
       </p:ext>
     </p:extLst>
   </p:cSld>
@@ -8042,7 +7852,7 @@
 </p:sld>
 </file>
 
-<file path=ppt/slides/slide26.xml><?xml version="1.0" encoding="utf-8"?>
+<file path=ppt/slides/slide25.xml><?xml version="1.0" encoding="utf-8"?>
 <p:sld xmlns:a="http://schemas.openxmlformats.org/drawingml/2006/main" xmlns:r="http://schemas.openxmlformats.org/officeDocument/2006/relationships" xmlns:p="http://schemas.openxmlformats.org/presentationml/2006/main">
   <p:cSld>
     <p:bg>
@@ -8208,6 +8018,305 @@
         </p:spPr>
         <p:txBody>
           <a:bodyPr vert="horz" lIns="91440" tIns="45720" rIns="91440" bIns="45720" rtlCol="0" anchor="b">
+            <a:normAutofit fontScale="90000"/>
+          </a:bodyPr>
+          <a:lstStyle/>
+          <a:p>
+            <a:r>
+              <a:rPr lang="en-US" sz="4800" kern="1200" dirty="0">
+                <a:solidFill>
+                  <a:srgbClr val="FFFFFF"/>
+                </a:solidFill>
+                <a:latin typeface="+mj-lt"/>
+                <a:ea typeface="+mj-ea"/>
+                <a:cs typeface="+mj-cs"/>
+              </a:rPr>
+              <a:t>CU-ENVIAR NOTIFICACION Y RECORDATORIOS A LOS USUARIOS</a:t>
+            </a:r>
+          </a:p>
+        </p:txBody>
+      </p:sp>
+      <p:pic>
+        <p:nvPicPr>
+          <p:cNvPr id="5" name="Imagen 4" descr="Diagrama&#10;&#10;Descripción generada automáticamente">
+            <a:extLst>
+              <a:ext uri="{FF2B5EF4-FFF2-40B4-BE49-F238E27FC236}">
+                <a16:creationId xmlns:a16="http://schemas.microsoft.com/office/drawing/2014/main" id="{2F44CE3B-2B0D-7665-C288-EE52692A4272}"/>
+              </a:ext>
+            </a:extLst>
+          </p:cNvPr>
+          <p:cNvPicPr>
+            <a:picLocks noChangeAspect="1"/>
+          </p:cNvPicPr>
+          <p:nvPr/>
+        </p:nvPicPr>
+        <p:blipFill>
+          <a:blip r:embed="rId2">
+            <a:extLst>
+              <a:ext uri="{28A0092B-C50C-407E-A947-70E740481C1C}">
+                <a14:useLocalDpi xmlns:a14="http://schemas.microsoft.com/office/drawing/2010/main" val="0"/>
+              </a:ext>
+            </a:extLst>
+          </a:blip>
+          <a:stretch>
+            <a:fillRect/>
+          </a:stretch>
+        </p:blipFill>
+        <p:spPr>
+          <a:xfrm>
+            <a:off x="762000" y="2032762"/>
+            <a:ext cx="10204451" cy="4036189"/>
+          </a:xfrm>
+          <a:prstGeom prst="rect">
+            <a:avLst/>
+          </a:prstGeom>
+        </p:spPr>
+      </p:pic>
+    </p:spTree>
+    <p:extLst>
+      <p:ext uri="{BB962C8B-B14F-4D97-AF65-F5344CB8AC3E}">
+        <p14:creationId xmlns:p14="http://schemas.microsoft.com/office/powerpoint/2010/main" val="3372768328"/>
+      </p:ext>
+    </p:extLst>
+  </p:cSld>
+  <p:clrMapOvr>
+    <a:overrideClrMapping bg1="dk1" tx1="lt1" bg2="dk2" tx2="lt2" accent1="accent1" accent2="accent2" accent3="accent3" accent4="accent4" accent5="accent5" accent6="accent6" hlink="hlink" folHlink="folHlink"/>
+  </p:clrMapOvr>
+</p:sld>
+</file>
+
+<file path=ppt/slides/slide26.xml><?xml version="1.0" encoding="utf-8"?>
+<p:sld xmlns:a="http://schemas.openxmlformats.org/drawingml/2006/main" xmlns:r="http://schemas.openxmlformats.org/officeDocument/2006/relationships" xmlns:p="http://schemas.openxmlformats.org/presentationml/2006/main">
+  <p:cSld>
+    <p:spTree>
+      <p:nvGrpSpPr>
+        <p:cNvPr id="1" name=""/>
+        <p:cNvGrpSpPr/>
+        <p:nvPr/>
+      </p:nvGrpSpPr>
+      <p:grpSpPr>
+        <a:xfrm>
+          <a:off x="0" y="0"/>
+          <a:ext cx="0" cy="0"/>
+          <a:chOff x="0" y="0"/>
+          <a:chExt cx="0" cy="0"/>
+        </a:xfrm>
+      </p:grpSpPr>
+      <p:pic>
+        <p:nvPicPr>
+          <p:cNvPr id="3" name="Imagen 2" descr="Imagen que contiene Diagrama&#10;&#10;Descripción generada automáticamente">
+            <a:extLst>
+              <a:ext uri="{FF2B5EF4-FFF2-40B4-BE49-F238E27FC236}">
+                <a16:creationId xmlns:a16="http://schemas.microsoft.com/office/drawing/2014/main" id="{3706A896-F00D-50DB-08C2-9C09BC16BE85}"/>
+              </a:ext>
+            </a:extLst>
+          </p:cNvPr>
+          <p:cNvPicPr>
+            <a:picLocks noChangeAspect="1"/>
+          </p:cNvPicPr>
+          <p:nvPr/>
+        </p:nvPicPr>
+        <p:blipFill>
+          <a:blip r:embed="rId2">
+            <a:extLst>
+              <a:ext uri="{28A0092B-C50C-407E-A947-70E740481C1C}">
+                <a14:useLocalDpi xmlns:a14="http://schemas.microsoft.com/office/drawing/2010/main" val="0"/>
+              </a:ext>
+            </a:extLst>
+          </a:blip>
+          <a:stretch>
+            <a:fillRect/>
+          </a:stretch>
+        </p:blipFill>
+        <p:spPr>
+          <a:xfrm>
+            <a:off x="0" y="1452732"/>
+            <a:ext cx="12192000" cy="3952535"/>
+          </a:xfrm>
+          <a:prstGeom prst="rect">
+            <a:avLst/>
+          </a:prstGeom>
+        </p:spPr>
+      </p:pic>
+    </p:spTree>
+    <p:extLst>
+      <p:ext uri="{BB962C8B-B14F-4D97-AF65-F5344CB8AC3E}">
+        <p14:creationId xmlns:p14="http://schemas.microsoft.com/office/powerpoint/2010/main" val="1895994895"/>
+      </p:ext>
+    </p:extLst>
+  </p:cSld>
+  <p:clrMapOvr>
+    <a:masterClrMapping/>
+  </p:clrMapOvr>
+</p:sld>
+</file>
+
+<file path=ppt/slides/slide27.xml><?xml version="1.0" encoding="utf-8"?>
+<p:sld xmlns:a="http://schemas.openxmlformats.org/drawingml/2006/main" xmlns:r="http://schemas.openxmlformats.org/officeDocument/2006/relationships" xmlns:p="http://schemas.openxmlformats.org/presentationml/2006/main">
+  <p:cSld>
+    <p:bg>
+      <p:bgPr>
+        <a:solidFill>
+          <a:schemeClr val="bg2"/>
+        </a:solidFill>
+        <a:effectLst/>
+      </p:bgPr>
+    </p:bg>
+    <p:spTree>
+      <p:nvGrpSpPr>
+        <p:cNvPr id="1" name=""/>
+        <p:cNvGrpSpPr/>
+        <p:nvPr/>
+      </p:nvGrpSpPr>
+      <p:grpSpPr>
+        <a:xfrm>
+          <a:off x="0" y="0"/>
+          <a:ext cx="0" cy="0"/>
+          <a:chOff x="0" y="0"/>
+          <a:chExt cx="0" cy="0"/>
+        </a:xfrm>
+      </p:grpSpPr>
+      <p:sp>
+        <p:nvSpPr>
+          <p:cNvPr id="9" name="Rectangle 8">
+            <a:extLst>
+              <a:ext uri="{FF2B5EF4-FFF2-40B4-BE49-F238E27FC236}">
+                <a16:creationId xmlns:a16="http://schemas.microsoft.com/office/drawing/2014/main" id="{10F24D38-B79E-44B4-830E-043F45D96DC2}"/>
+              </a:ext>
+              <a:ext uri="{C183D7F6-B498-43B3-948B-1728B52AA6E4}">
+                <adec:decorative xmlns:adec="http://schemas.microsoft.com/office/drawing/2017/decorative" val="1"/>
+              </a:ext>
+            </a:extLst>
+          </p:cNvPr>
+          <p:cNvSpPr>
+            <a:spLocks noGrp="1" noRot="1" noChangeAspect="1" noMove="1" noResize="1" noEditPoints="1" noAdjustHandles="1" noChangeArrowheads="1" noChangeShapeType="1" noTextEdit="1"/>
+          </p:cNvSpPr>
+          <p:nvPr>
+            <p:extLst>
+              <p:ext uri="{386F3935-93C4-4BCD-93E2-E3B085C9AB24}">
+                <p16:designElem xmlns:p16="http://schemas.microsoft.com/office/powerpoint/2015/main" val="1"/>
+              </p:ext>
+            </p:extLst>
+          </p:nvPr>
+        </p:nvSpPr>
+        <p:spPr>
+          <a:xfrm>
+            <a:off x="0" y="0"/>
+            <a:ext cx="12192000" cy="6858000"/>
+          </a:xfrm>
+          <a:prstGeom prst="rect">
+            <a:avLst/>
+          </a:prstGeom>
+          <a:solidFill>
+            <a:schemeClr val="accent1"/>
+          </a:solidFill>
+          <a:ln>
+            <a:noFill/>
+          </a:ln>
+        </p:spPr>
+        <p:style>
+          <a:lnRef idx="2">
+            <a:schemeClr val="accent1">
+              <a:shade val="50000"/>
+            </a:schemeClr>
+          </a:lnRef>
+          <a:fillRef idx="1">
+            <a:schemeClr val="accent1"/>
+          </a:fillRef>
+          <a:effectRef idx="0">
+            <a:schemeClr val="accent1"/>
+          </a:effectRef>
+          <a:fontRef idx="minor">
+            <a:schemeClr val="lt1"/>
+          </a:fontRef>
+        </p:style>
+        <p:txBody>
+          <a:bodyPr rtlCol="0" anchor="ctr"/>
+          <a:lstStyle/>
+          <a:p>
+            <a:pPr algn="ctr"/>
+            <a:endParaRPr lang="en-US"/>
+          </a:p>
+        </p:txBody>
+      </p:sp>
+      <p:cxnSp>
+        <p:nvCxnSpPr>
+          <p:cNvPr id="11" name="Straight Connector 10">
+            <a:extLst>
+              <a:ext uri="{FF2B5EF4-FFF2-40B4-BE49-F238E27FC236}">
+                <a16:creationId xmlns:a16="http://schemas.microsoft.com/office/drawing/2014/main" id="{FC469874-256B-45B3-A79C-7591B4BA1ECC}"/>
+              </a:ext>
+              <a:ext uri="{C183D7F6-B498-43B3-948B-1728B52AA6E4}">
+                <adec:decorative xmlns:adec="http://schemas.microsoft.com/office/drawing/2017/decorative" val="1"/>
+              </a:ext>
+            </a:extLst>
+          </p:cNvPr>
+          <p:cNvCxnSpPr>
+            <a:cxnSpLocks noGrp="1" noRot="1" noChangeAspect="1" noMove="1" noResize="1" noEditPoints="1" noAdjustHandles="1" noChangeArrowheads="1" noChangeShapeType="1"/>
+          </p:cNvCxnSpPr>
+          <p:nvPr>
+            <p:extLst>
+              <p:ext uri="{386F3935-93C4-4BCD-93E2-E3B085C9AB24}">
+                <p16:designElem xmlns:p16="http://schemas.microsoft.com/office/powerpoint/2015/main" val="1"/>
+              </p:ext>
+            </p:extLst>
+          </p:nvPr>
+        </p:nvCxnSpPr>
+        <p:spPr>
+          <a:xfrm flipV="1">
+            <a:off x="762000" y="826324"/>
+            <a:ext cx="0" cy="914400"/>
+          </a:xfrm>
+          <a:prstGeom prst="line">
+            <a:avLst/>
+          </a:prstGeom>
+          <a:ln w="19050">
+            <a:solidFill>
+              <a:srgbClr val="FFFFFF">
+                <a:alpha val="80000"/>
+              </a:srgbClr>
+            </a:solidFill>
+          </a:ln>
+        </p:spPr>
+        <p:style>
+          <a:lnRef idx="1">
+            <a:schemeClr val="accent1"/>
+          </a:lnRef>
+          <a:fillRef idx="0">
+            <a:schemeClr val="accent1"/>
+          </a:fillRef>
+          <a:effectRef idx="0">
+            <a:schemeClr val="accent1"/>
+          </a:effectRef>
+          <a:fontRef idx="minor">
+            <a:schemeClr val="tx1"/>
+          </a:fontRef>
+        </p:style>
+      </p:cxnSp>
+      <p:sp>
+        <p:nvSpPr>
+          <p:cNvPr id="10" name="Título 1">
+            <a:extLst>
+              <a:ext uri="{FF2B5EF4-FFF2-40B4-BE49-F238E27FC236}">
+                <a16:creationId xmlns:a16="http://schemas.microsoft.com/office/drawing/2014/main" id="{09594B29-7ACF-600D-9D79-2A598A95B9ED}"/>
+              </a:ext>
+            </a:extLst>
+          </p:cNvPr>
+          <p:cNvSpPr>
+            <a:spLocks noGrp="1"/>
+          </p:cNvSpPr>
+          <p:nvPr>
+            <p:ph type="title"/>
+          </p:nvPr>
+        </p:nvSpPr>
+        <p:spPr>
+          <a:xfrm>
+            <a:off x="690665" y="818985"/>
+            <a:ext cx="10186602" cy="921740"/>
+          </a:xfrm>
+        </p:spPr>
+        <p:txBody>
+          <a:bodyPr vert="horz" lIns="91440" tIns="45720" rIns="91440" bIns="45720" rtlCol="0" anchor="b">
             <a:normAutofit/>
           </a:bodyPr>
           <a:lstStyle/>
@@ -8275,7 +8384,7 @@
 </p:sld>
 </file>
 
-<file path=ppt/slides/slide27.xml><?xml version="1.0" encoding="utf-8"?>
+<file path=ppt/slides/slide28.xml><?xml version="1.0" encoding="utf-8"?>
 <p:sld xmlns:a="http://schemas.openxmlformats.org/drawingml/2006/main" xmlns:r="http://schemas.openxmlformats.org/officeDocument/2006/relationships" xmlns:p="http://schemas.openxmlformats.org/presentationml/2006/main">
   <p:cSld>
     <p:spTree>
@@ -8341,7 +8450,7 @@
 </p:sld>
 </file>
 
-<file path=ppt/slides/slide28.xml><?xml version="1.0" encoding="utf-8"?>
+<file path=ppt/slides/slide29.xml><?xml version="1.0" encoding="utf-8"?>
 <p:sld xmlns:a="http://schemas.openxmlformats.org/drawingml/2006/main" xmlns:r="http://schemas.openxmlformats.org/officeDocument/2006/relationships" xmlns:p="http://schemas.openxmlformats.org/presentationml/2006/main">
   <p:cSld>
     <p:bg>
@@ -11928,10 +12037,10 @@
       </p:sp>
       <p:pic>
         <p:nvPicPr>
-          <p:cNvPr id="12" name="Imagen 11" descr="Diagrama&#10;&#10;Descripción generada automáticamente">
-            <a:extLst>
-              <a:ext uri="{FF2B5EF4-FFF2-40B4-BE49-F238E27FC236}">
-                <a16:creationId xmlns:a16="http://schemas.microsoft.com/office/drawing/2014/main" id="{1C9670AC-5790-47D7-33A9-7CC4E514CFE4}"/>
+          <p:cNvPr id="3" name="Imagen 2" descr="Diagrama&#10;&#10;Descripción generada automáticamente">
+            <a:extLst>
+              <a:ext uri="{FF2B5EF4-FFF2-40B4-BE49-F238E27FC236}">
+                <a16:creationId xmlns:a16="http://schemas.microsoft.com/office/drawing/2014/main" id="{911C8EAD-36C3-C9FF-EB46-58C475C83339}"/>
               </a:ext>
             </a:extLst>
           </p:cNvPr>
@@ -11954,8 +12063,8 @@
         </p:blipFill>
         <p:spPr>
           <a:xfrm>
-            <a:off x="1003617" y="1837372"/>
-            <a:ext cx="10448925" cy="4524375"/>
+            <a:off x="987066" y="1946326"/>
+            <a:ext cx="9173880" cy="3628565"/>
           </a:xfrm>
           <a:prstGeom prst="rect">
             <a:avLst/>

</xml_diff>